<commit_message>
added colors to logos
</commit_message>
<xml_diff>
--- a/Presentations/Proposal_Presentation.pptx
+++ b/Presentations/Proposal_Presentation.pptx
@@ -223,7 +223,7 @@
           <a:p>
             <a:fld id="{B80D95BA-7ABD-45D4-B691-9F58B13542F8}" type="datetimeFigureOut">
               <a:rPr lang="en-US" smtClean="0"/>
-              <a:t>10/25/2021</a:t>
+              <a:t>10/28/2021</a:t>
             </a:fld>
             <a:endParaRPr lang="en-US" dirty="0"/>
           </a:p>
@@ -400,7 +400,7 @@
           <a:p>
             <a:fld id="{599D14A6-BAC8-4A71-919C-314181CF34EF}" type="datetimeFigureOut">
               <a:rPr lang="en-US" smtClean="0"/>
-              <a:t>10/25/2021</a:t>
+              <a:t>10/28/2021</a:t>
             </a:fld>
             <a:endParaRPr lang="en-US" dirty="0"/>
           </a:p>
@@ -30379,7 +30379,7 @@
           <a:p>
             <a:r>
               <a:rPr lang="en-US" dirty="0"/>
-              <a:t>-lalindu-</a:t>
+              <a:t>-lalindu Wenasara Sudasingha-</a:t>
             </a:r>
           </a:p>
         </p:txBody>
@@ -31387,6 +31387,34 @@
 </file>
 
 <file path=customXml/item1.xml><?xml version="1.0" encoding="utf-8"?>
+<p:properties xmlns:p="http://schemas.microsoft.com/office/2006/metadata/properties" xmlns:xsi="http://www.w3.org/2001/XMLSchema-instance" xmlns:pc="http://schemas.microsoft.com/office/infopath/2007/PartnerControls">
+  <documentManagement>
+    <Status xmlns="71af3243-3dd4-4a8d-8c0d-dd76da1f02a5">Not started</Status>
+    <_ip_UnifiedCompliancePolicyUIAction xmlns="http://schemas.microsoft.com/sharepoint/v3" xsi:nil="true"/>
+    <Image xmlns="71af3243-3dd4-4a8d-8c0d-dd76da1f02a5">
+      <Url xsi:nil="true"/>
+      <Description xsi:nil="true"/>
+    </Image>
+    <_ip_UnifiedCompliancePolicyProperties xmlns="http://schemas.microsoft.com/sharepoint/v3" xsi:nil="true"/>
+    <lcf76f155ced4ddcb4097134ff3c332f xmlns="71af3243-3dd4-4a8d-8c0d-dd76da1f02a5">
+      <Terms xmlns="http://schemas.microsoft.com/office/infopath/2007/PartnerControls"/>
+    </lcf76f155ced4ddcb4097134ff3c332f>
+    <TaxCatchAll xmlns="230e9df3-be65-4c73-a93b-d1236ebd677e"/>
+    <MediaServiceKeyPoints xmlns="71af3243-3dd4-4a8d-8c0d-dd76da1f02a5" xsi:nil="true"/>
+  </documentManagement>
+</p:properties>
+</file>
+
+<file path=customXml/item2.xml><?xml version="1.0" encoding="utf-8"?>
+<?mso-contentType ?>
+<FormTemplates xmlns="http://schemas.microsoft.com/sharepoint/v3/contenttype/forms">
+  <Display>DocumentLibraryForm</Display>
+  <Edit>DocumentLibraryForm</Edit>
+  <New>DocumentLibraryForm</New>
+</FormTemplates>
+</file>
+
+<file path=customXml/item3.xml><?xml version="1.0" encoding="utf-8"?>
 <ct:contentTypeSchema xmlns:ct="http://schemas.microsoft.com/office/2006/metadata/contentType" xmlns:ma="http://schemas.microsoft.com/office/2006/metadata/properties/metaAttributes" ct:_="" ma:_="" ma:contentTypeName="Document" ma:contentTypeID="0x01010079F111ED35F8CC479449609E8A0923A6" ma:contentTypeVersion="18" ma:contentTypeDescription="Create a new document." ma:contentTypeScope="" ma:versionID="22a266b9fa9a230c5a512669d8b298c3">
   <xsd:schema xmlns:xsd="http://www.w3.org/2001/XMLSchema" xmlns:xs="http://www.w3.org/2001/XMLSchema" xmlns:p="http://schemas.microsoft.com/office/2006/metadata/properties" xmlns:ns1="http://schemas.microsoft.com/sharepoint/v3" xmlns:ns2="71af3243-3dd4-4a8d-8c0d-dd76da1f02a5" xmlns:ns3="16c05727-aa75-4e4a-9b5f-8a80a1165891" xmlns:ns4="230e9df3-be65-4c73-a93b-d1236ebd677e" targetNamespace="http://schemas.microsoft.com/office/2006/metadata/properties" ma:root="true" ma:fieldsID="eddc33fff6b14141ee5c74a0d29ea6a1" ns1:_="" ns2:_="" ns3:_="" ns4:_="">
     <xsd:import namespace="http://schemas.microsoft.com/sharepoint/v3"/>
@@ -31662,35 +31690,27 @@
 </ct:contentTypeSchema>
 </file>
 
-<file path=customXml/item2.xml><?xml version="1.0" encoding="utf-8"?>
-<?mso-contentType ?>
-<FormTemplates xmlns="http://schemas.microsoft.com/sharepoint/v3/contenttype/forms">
-  <Display>DocumentLibraryForm</Display>
-  <Edit>DocumentLibraryForm</Edit>
-  <New>DocumentLibraryForm</New>
-</FormTemplates>
+<file path=customXml/itemProps1.xml><?xml version="1.0" encoding="utf-8"?>
+<ds:datastoreItem xmlns:ds="http://schemas.openxmlformats.org/officeDocument/2006/customXml" ds:itemID="{C9E13122-F311-42FD-A551-F80E95967A7B}">
+  <ds:schemaRefs>
+    <ds:schemaRef ds:uri="http://schemas.microsoft.com/office/2006/metadata/properties"/>
+    <ds:schemaRef ds:uri="http://schemas.microsoft.com/office/infopath/2007/PartnerControls"/>
+    <ds:schemaRef ds:uri="71af3243-3dd4-4a8d-8c0d-dd76da1f02a5"/>
+    <ds:schemaRef ds:uri="http://schemas.microsoft.com/sharepoint/v3"/>
+    <ds:schemaRef ds:uri="230e9df3-be65-4c73-a93b-d1236ebd677e"/>
+  </ds:schemaRefs>
+</ds:datastoreItem>
 </file>
 
-<file path=customXml/item3.xml><?xml version="1.0" encoding="utf-8"?>
-<p:properties xmlns:p="http://schemas.microsoft.com/office/2006/metadata/properties" xmlns:xsi="http://www.w3.org/2001/XMLSchema-instance" xmlns:pc="http://schemas.microsoft.com/office/infopath/2007/PartnerControls">
-  <documentManagement>
-    <Status xmlns="71af3243-3dd4-4a8d-8c0d-dd76da1f02a5">Not started</Status>
-    <_ip_UnifiedCompliancePolicyUIAction xmlns="http://schemas.microsoft.com/sharepoint/v3" xsi:nil="true"/>
-    <Image xmlns="71af3243-3dd4-4a8d-8c0d-dd76da1f02a5">
-      <Url xsi:nil="true"/>
-      <Description xsi:nil="true"/>
-    </Image>
-    <_ip_UnifiedCompliancePolicyProperties xmlns="http://schemas.microsoft.com/sharepoint/v3" xsi:nil="true"/>
-    <lcf76f155ced4ddcb4097134ff3c332f xmlns="71af3243-3dd4-4a8d-8c0d-dd76da1f02a5">
-      <Terms xmlns="http://schemas.microsoft.com/office/infopath/2007/PartnerControls"/>
-    </lcf76f155ced4ddcb4097134ff3c332f>
-    <TaxCatchAll xmlns="230e9df3-be65-4c73-a93b-d1236ebd677e"/>
-    <MediaServiceKeyPoints xmlns="71af3243-3dd4-4a8d-8c0d-dd76da1f02a5" xsi:nil="true"/>
-  </documentManagement>
-</p:properties>
+<file path=customXml/itemProps2.xml><?xml version="1.0" encoding="utf-8"?>
+<ds:datastoreItem xmlns:ds="http://schemas.openxmlformats.org/officeDocument/2006/customXml" ds:itemID="{E8E41239-C5EC-4F83-8E98-7D7D6C2BBFDA}">
+  <ds:schemaRefs>
+    <ds:schemaRef ds:uri="http://schemas.microsoft.com/sharepoint/v3/contenttype/forms"/>
+  </ds:schemaRefs>
+</ds:datastoreItem>
 </file>
 
-<file path=customXml/itemProps1.xml><?xml version="1.0" encoding="utf-8"?>
+<file path=customXml/itemProps3.xml><?xml version="1.0" encoding="utf-8"?>
 <ds:datastoreItem xmlns:ds="http://schemas.openxmlformats.org/officeDocument/2006/customXml" ds:itemID="{4BD88FD9-F816-4DDA-AB4F-EFDCB988DBD5}">
   <ds:schemaRefs>
     <ds:schemaRef ds:uri="http://schemas.microsoft.com/office/2006/metadata/contentType"/>
@@ -31709,24 +31729,4 @@
     <ds:schemaRef ds:uri="http://schemas.microsoft.com/internal/obd"/>
   </ds:schemaRefs>
 </ds:datastoreItem>
-</file>
-
-<file path=customXml/itemProps2.xml><?xml version="1.0" encoding="utf-8"?>
-<ds:datastoreItem xmlns:ds="http://schemas.openxmlformats.org/officeDocument/2006/customXml" ds:itemID="{E8E41239-C5EC-4F83-8E98-7D7D6C2BBFDA}">
-  <ds:schemaRefs>
-    <ds:schemaRef ds:uri="http://schemas.microsoft.com/sharepoint/v3/contenttype/forms"/>
-  </ds:schemaRefs>
-</ds:datastoreItem>
-</file>
-
-<file path=customXml/itemProps3.xml><?xml version="1.0" encoding="utf-8"?>
-<ds:datastoreItem xmlns:ds="http://schemas.openxmlformats.org/officeDocument/2006/customXml" ds:itemID="{C9E13122-F311-42FD-A551-F80E95967A7B}">
-  <ds:schemaRefs>
-    <ds:schemaRef ds:uri="http://schemas.microsoft.com/office/2006/metadata/properties"/>
-    <ds:schemaRef ds:uri="http://schemas.microsoft.com/office/infopath/2007/PartnerControls"/>
-    <ds:schemaRef ds:uri="71af3243-3dd4-4a8d-8c0d-dd76da1f02a5"/>
-    <ds:schemaRef ds:uri="http://schemas.microsoft.com/sharepoint/v3"/>
-    <ds:schemaRef ds:uri="230e9df3-be65-4c73-a93b-d1236ebd677e"/>
-  </ds:schemaRefs>
-</ds:datastoreItem>
 </file>
</xml_diff>